<commit_message>
improvement on command 'more/less' to support horizontal scrolling
</commit_message>
<xml_diff>
--- a/docs/dbcli.pptx
+++ b/docs/dbcli.pptx
@@ -255,7 +255,7 @@
           <a:p>
             <a:fld id="{8924A7D2-5F3F-4CDE-BB06-760ED7F7BFAC}" type="datetimeFigureOut">
               <a:rPr lang="en-US" smtClean="0"/>
-              <a:t>12/24/2018</a:t>
+              <a:t>1/5/2019</a:t>
             </a:fld>
             <a:endParaRPr lang="en-US"/>
           </a:p>
@@ -6479,7 +6479,7 @@
           <a:p>
             <a:fld id="{830CF026-2A7D-4AC1-A6EC-3EB8F9A9FDD9}" type="datetimeFigureOut">
               <a:rPr lang="en-US" smtClean="0"/>
-              <a:t>12/24/2018</a:t>
+              <a:t>1/5/2019</a:t>
             </a:fld>
             <a:endParaRPr lang="en-US"/>
           </a:p>
@@ -6679,7 +6679,7 @@
           <a:p>
             <a:fld id="{830CF026-2A7D-4AC1-A6EC-3EB8F9A9FDD9}" type="datetimeFigureOut">
               <a:rPr lang="en-US" smtClean="0"/>
-              <a:t>12/24/2018</a:t>
+              <a:t>1/5/2019</a:t>
             </a:fld>
             <a:endParaRPr lang="en-US"/>
           </a:p>
@@ -6889,7 +6889,7 @@
           <a:p>
             <a:fld id="{830CF026-2A7D-4AC1-A6EC-3EB8F9A9FDD9}" type="datetimeFigureOut">
               <a:rPr lang="en-US" smtClean="0"/>
-              <a:t>12/24/2018</a:t>
+              <a:t>1/5/2019</a:t>
             </a:fld>
             <a:endParaRPr lang="en-US"/>
           </a:p>
@@ -7089,7 +7089,7 @@
           <a:p>
             <a:fld id="{830CF026-2A7D-4AC1-A6EC-3EB8F9A9FDD9}" type="datetimeFigureOut">
               <a:rPr lang="en-US" smtClean="0"/>
-              <a:t>12/24/2018</a:t>
+              <a:t>1/5/2019</a:t>
             </a:fld>
             <a:endParaRPr lang="en-US"/>
           </a:p>
@@ -7365,7 +7365,7 @@
           <a:p>
             <a:fld id="{830CF026-2A7D-4AC1-A6EC-3EB8F9A9FDD9}" type="datetimeFigureOut">
               <a:rPr lang="en-US" smtClean="0"/>
-              <a:t>12/24/2018</a:t>
+              <a:t>1/5/2019</a:t>
             </a:fld>
             <a:endParaRPr lang="en-US"/>
           </a:p>
@@ -7633,7 +7633,7 @@
           <a:p>
             <a:fld id="{830CF026-2A7D-4AC1-A6EC-3EB8F9A9FDD9}" type="datetimeFigureOut">
               <a:rPr lang="en-US" smtClean="0"/>
-              <a:t>12/24/2018</a:t>
+              <a:t>1/5/2019</a:t>
             </a:fld>
             <a:endParaRPr lang="en-US"/>
           </a:p>
@@ -8048,7 +8048,7 @@
           <a:p>
             <a:fld id="{830CF026-2A7D-4AC1-A6EC-3EB8F9A9FDD9}" type="datetimeFigureOut">
               <a:rPr lang="en-US" smtClean="0"/>
-              <a:t>12/24/2018</a:t>
+              <a:t>1/5/2019</a:t>
             </a:fld>
             <a:endParaRPr lang="en-US"/>
           </a:p>
@@ -8190,7 +8190,7 @@
           <a:p>
             <a:fld id="{830CF026-2A7D-4AC1-A6EC-3EB8F9A9FDD9}" type="datetimeFigureOut">
               <a:rPr lang="en-US" smtClean="0"/>
-              <a:t>12/24/2018</a:t>
+              <a:t>1/5/2019</a:t>
             </a:fld>
             <a:endParaRPr lang="en-US"/>
           </a:p>
@@ -8303,7 +8303,7 @@
           <a:p>
             <a:fld id="{830CF026-2A7D-4AC1-A6EC-3EB8F9A9FDD9}" type="datetimeFigureOut">
               <a:rPr lang="en-US" smtClean="0"/>
-              <a:t>12/24/2018</a:t>
+              <a:t>1/5/2019</a:t>
             </a:fld>
             <a:endParaRPr lang="en-US"/>
           </a:p>
@@ -8616,7 +8616,7 @@
           <a:p>
             <a:fld id="{830CF026-2A7D-4AC1-A6EC-3EB8F9A9FDD9}" type="datetimeFigureOut">
               <a:rPr lang="en-US" smtClean="0"/>
-              <a:t>12/24/2018</a:t>
+              <a:t>1/5/2019</a:t>
             </a:fld>
             <a:endParaRPr lang="en-US"/>
           </a:p>
@@ -8905,7 +8905,7 @@
           <a:p>
             <a:fld id="{830CF026-2A7D-4AC1-A6EC-3EB8F9A9FDD9}" type="datetimeFigureOut">
               <a:rPr lang="en-US" smtClean="0"/>
-              <a:t>12/24/2018</a:t>
+              <a:t>1/5/2019</a:t>
             </a:fld>
             <a:endParaRPr lang="en-US"/>
           </a:p>
@@ -9148,7 +9148,7 @@
           <a:p>
             <a:fld id="{830CF026-2A7D-4AC1-A6EC-3EB8F9A9FDD9}" type="datetimeFigureOut">
               <a:rPr lang="en-US" smtClean="0"/>
-              <a:t>12/24/2018</a:t>
+              <a:t>1/5/2019</a:t>
             </a:fld>
             <a:endParaRPr lang="en-US"/>
           </a:p>
@@ -25212,7 +25212,7 @@
           <a:graphicData uri="http://schemas.openxmlformats.org/presentationml/2006/ole">
             <mc:AlternateContent xmlns:mc="http://schemas.openxmlformats.org/markup-compatibility/2006">
               <mc:Choice xmlns:v="urn:schemas-microsoft-com:vml" Requires="v">
-                <p:oleObj spid="_x0000_s1113" name="BMP 图像" r:id="rId4" imgW="5000760" imgH="2257560" progId="Paint.Picture">
+                <p:oleObj spid="_x0000_s1116" name="BMP 图像" r:id="rId4" imgW="5000760" imgH="2257560" progId="Paint.Picture">
                   <p:embed/>
                 </p:oleObj>
               </mc:Choice>
@@ -25687,7 +25687,7 @@
         </p:spPr>
         <p:txBody>
           <a:bodyPr>
-            <a:normAutofit lnSpcReduction="10000"/>
+            <a:normAutofit/>
           </a:bodyPr>
           <a:lstStyle/>
           <a:p>
@@ -25699,50 +25699,51 @@
           <a:p>
             <a:r>
               <a:rPr lang="en-US" dirty="0"/>
-              <a:t>To view the missing information, use command “out”, which will launch the editor to view the historical outputs.</a:t>
-            </a:r>
-          </a:p>
-          <a:p>
-            <a:r>
-              <a:rPr lang="en-US" dirty="0"/>
-              <a:t>In case of the default editor is “vi”, you can use “e/b/</a:t>
-            </a:r>
-            <a:r>
-              <a:rPr lang="en-US" dirty="0" err="1"/>
-              <a:t>zL</a:t>
-            </a:r>
-            <a:r>
-              <a:rPr lang="en-US" dirty="0"/>
-              <a:t>/</a:t>
-            </a:r>
-            <a:r>
-              <a:rPr lang="en-US" dirty="0" err="1"/>
-              <a:t>zH</a:t>
-            </a:r>
-            <a:r>
-              <a:rPr lang="en-US" dirty="0"/>
-              <a:t>” to scroll the screen</a:t>
-            </a:r>
-          </a:p>
-          <a:p>
-            <a:r>
-              <a:rPr lang="en-US" dirty="0"/>
-              <a:t>Use “set editor [&lt;name&gt;]” to define the </a:t>
+              <a:t>To view the missing information:</a:t>
+            </a:r>
+          </a:p>
+          <a:p>
+            <a:pPr lvl="1"/>
+            <a:r>
+              <a:rPr lang="en-US" dirty="0"/>
+              <a:t>Use command “&lt;query&gt;|more” to enter the Linux-style more mode, and press arrow keys to scroll </a:t>
             </a:r>
             <a:r>
               <a:rPr lang="en-US"/>
-              <a:t>default editor</a:t>
+              <a:t>the screen </a:t>
             </a:r>
             <a:endParaRPr lang="en-US" dirty="0"/>
           </a:p>
           <a:p>
+            <a:pPr lvl="1"/>
+            <a:r>
+              <a:rPr lang="en-US" dirty="0"/>
+              <a:t>Use command “out”, which will launch the editor to view the historical outputs.</a:t>
+            </a:r>
+          </a:p>
+          <a:p>
+            <a:pPr lvl="2"/>
+            <a:r>
+              <a:rPr lang="en-US" dirty="0"/>
+              <a:t>In case of the default editor is “vi”, you can use “W/B” to scroll the screen</a:t>
+            </a:r>
+          </a:p>
+          <a:p>
+            <a:pPr lvl="2"/>
+            <a:r>
+              <a:rPr lang="en-US" dirty="0"/>
+              <a:t>Use “set editor [&lt;name&gt;]” to define the default editor</a:t>
+            </a:r>
+          </a:p>
+          <a:p>
+            <a:pPr lvl="2"/>
             <a:r>
               <a:rPr lang="en-US" dirty="0"/>
               <a:t>Command “out”</a:t>
             </a:r>
           </a:p>
           <a:p>
-            <a:pPr lvl="1"/>
+            <a:pPr lvl="3"/>
             <a:r>
               <a:rPr lang="en-US" dirty="0">
                 <a:solidFill>
@@ -25765,7 +25766,7 @@
             </a:r>
           </a:p>
           <a:p>
-            <a:pPr lvl="1"/>
+            <a:pPr lvl="3"/>
             <a:r>
               <a:rPr lang="en-US" dirty="0">
                 <a:solidFill>
@@ -25788,7 +25789,7 @@
             </a:r>
           </a:p>
           <a:p>
-            <a:pPr lvl="1"/>
+            <a:pPr lvl="3"/>
             <a:r>
               <a:rPr lang="en-US" dirty="0">
                 <a:solidFill>

</xml_diff>

<commit_message>
ready for next release
</commit_message>
<xml_diff>
--- a/docs/dbcli.pptx
+++ b/docs/dbcli.pptx
@@ -255,7 +255,7 @@
           <a:p>
             <a:fld id="{8924A7D2-5F3F-4CDE-BB06-760ED7F7BFAC}" type="datetimeFigureOut">
               <a:rPr lang="en-US" smtClean="0"/>
-              <a:t>12/24/2018</a:t>
+              <a:t>1/5/2019</a:t>
             </a:fld>
             <a:endParaRPr lang="en-US"/>
           </a:p>
@@ -6479,7 +6479,7 @@
           <a:p>
             <a:fld id="{830CF026-2A7D-4AC1-A6EC-3EB8F9A9FDD9}" type="datetimeFigureOut">
               <a:rPr lang="en-US" smtClean="0"/>
-              <a:t>12/24/2018</a:t>
+              <a:t>1/5/2019</a:t>
             </a:fld>
             <a:endParaRPr lang="en-US"/>
           </a:p>
@@ -6679,7 +6679,7 @@
           <a:p>
             <a:fld id="{830CF026-2A7D-4AC1-A6EC-3EB8F9A9FDD9}" type="datetimeFigureOut">
               <a:rPr lang="en-US" smtClean="0"/>
-              <a:t>12/24/2018</a:t>
+              <a:t>1/5/2019</a:t>
             </a:fld>
             <a:endParaRPr lang="en-US"/>
           </a:p>
@@ -6889,7 +6889,7 @@
           <a:p>
             <a:fld id="{830CF026-2A7D-4AC1-A6EC-3EB8F9A9FDD9}" type="datetimeFigureOut">
               <a:rPr lang="en-US" smtClean="0"/>
-              <a:t>12/24/2018</a:t>
+              <a:t>1/5/2019</a:t>
             </a:fld>
             <a:endParaRPr lang="en-US"/>
           </a:p>
@@ -7089,7 +7089,7 @@
           <a:p>
             <a:fld id="{830CF026-2A7D-4AC1-A6EC-3EB8F9A9FDD9}" type="datetimeFigureOut">
               <a:rPr lang="en-US" smtClean="0"/>
-              <a:t>12/24/2018</a:t>
+              <a:t>1/5/2019</a:t>
             </a:fld>
             <a:endParaRPr lang="en-US"/>
           </a:p>
@@ -7365,7 +7365,7 @@
           <a:p>
             <a:fld id="{830CF026-2A7D-4AC1-A6EC-3EB8F9A9FDD9}" type="datetimeFigureOut">
               <a:rPr lang="en-US" smtClean="0"/>
-              <a:t>12/24/2018</a:t>
+              <a:t>1/5/2019</a:t>
             </a:fld>
             <a:endParaRPr lang="en-US"/>
           </a:p>
@@ -7633,7 +7633,7 @@
           <a:p>
             <a:fld id="{830CF026-2A7D-4AC1-A6EC-3EB8F9A9FDD9}" type="datetimeFigureOut">
               <a:rPr lang="en-US" smtClean="0"/>
-              <a:t>12/24/2018</a:t>
+              <a:t>1/5/2019</a:t>
             </a:fld>
             <a:endParaRPr lang="en-US"/>
           </a:p>
@@ -8048,7 +8048,7 @@
           <a:p>
             <a:fld id="{830CF026-2A7D-4AC1-A6EC-3EB8F9A9FDD9}" type="datetimeFigureOut">
               <a:rPr lang="en-US" smtClean="0"/>
-              <a:t>12/24/2018</a:t>
+              <a:t>1/5/2019</a:t>
             </a:fld>
             <a:endParaRPr lang="en-US"/>
           </a:p>
@@ -8190,7 +8190,7 @@
           <a:p>
             <a:fld id="{830CF026-2A7D-4AC1-A6EC-3EB8F9A9FDD9}" type="datetimeFigureOut">
               <a:rPr lang="en-US" smtClean="0"/>
-              <a:t>12/24/2018</a:t>
+              <a:t>1/5/2019</a:t>
             </a:fld>
             <a:endParaRPr lang="en-US"/>
           </a:p>
@@ -8303,7 +8303,7 @@
           <a:p>
             <a:fld id="{830CF026-2A7D-4AC1-A6EC-3EB8F9A9FDD9}" type="datetimeFigureOut">
               <a:rPr lang="en-US" smtClean="0"/>
-              <a:t>12/24/2018</a:t>
+              <a:t>1/5/2019</a:t>
             </a:fld>
             <a:endParaRPr lang="en-US"/>
           </a:p>
@@ -8616,7 +8616,7 @@
           <a:p>
             <a:fld id="{830CF026-2A7D-4AC1-A6EC-3EB8F9A9FDD9}" type="datetimeFigureOut">
               <a:rPr lang="en-US" smtClean="0"/>
-              <a:t>12/24/2018</a:t>
+              <a:t>1/5/2019</a:t>
             </a:fld>
             <a:endParaRPr lang="en-US"/>
           </a:p>
@@ -8905,7 +8905,7 @@
           <a:p>
             <a:fld id="{830CF026-2A7D-4AC1-A6EC-3EB8F9A9FDD9}" type="datetimeFigureOut">
               <a:rPr lang="en-US" smtClean="0"/>
-              <a:t>12/24/2018</a:t>
+              <a:t>1/5/2019</a:t>
             </a:fld>
             <a:endParaRPr lang="en-US"/>
           </a:p>
@@ -9148,7 +9148,7 @@
           <a:p>
             <a:fld id="{830CF026-2A7D-4AC1-A6EC-3EB8F9A9FDD9}" type="datetimeFigureOut">
               <a:rPr lang="en-US" smtClean="0"/>
-              <a:t>12/24/2018</a:t>
+              <a:t>1/5/2019</a:t>
             </a:fld>
             <a:endParaRPr lang="en-US"/>
           </a:p>
@@ -25212,7 +25212,7 @@
           <a:graphicData uri="http://schemas.openxmlformats.org/presentationml/2006/ole">
             <mc:AlternateContent xmlns:mc="http://schemas.openxmlformats.org/markup-compatibility/2006">
               <mc:Choice xmlns:v="urn:schemas-microsoft-com:vml" Requires="v">
-                <p:oleObj spid="_x0000_s1113" name="BMP 图像" r:id="rId4" imgW="5000760" imgH="2257560" progId="Paint.Picture">
+                <p:oleObj spid="_x0000_s1116" name="BMP 图像" r:id="rId4" imgW="5000760" imgH="2257560" progId="Paint.Picture">
                   <p:embed/>
                 </p:oleObj>
               </mc:Choice>
@@ -25687,7 +25687,7 @@
         </p:spPr>
         <p:txBody>
           <a:bodyPr>
-            <a:normAutofit lnSpcReduction="10000"/>
+            <a:normAutofit/>
           </a:bodyPr>
           <a:lstStyle/>
           <a:p>
@@ -25699,50 +25699,51 @@
           <a:p>
             <a:r>
               <a:rPr lang="en-US" dirty="0"/>
-              <a:t>To view the missing information, use command “out”, which will launch the editor to view the historical outputs.</a:t>
-            </a:r>
-          </a:p>
-          <a:p>
-            <a:r>
-              <a:rPr lang="en-US" dirty="0"/>
-              <a:t>In case of the default editor is “vi”, you can use “e/b/</a:t>
-            </a:r>
-            <a:r>
-              <a:rPr lang="en-US" dirty="0" err="1"/>
-              <a:t>zL</a:t>
-            </a:r>
-            <a:r>
-              <a:rPr lang="en-US" dirty="0"/>
-              <a:t>/</a:t>
-            </a:r>
-            <a:r>
-              <a:rPr lang="en-US" dirty="0" err="1"/>
-              <a:t>zH</a:t>
-            </a:r>
-            <a:r>
-              <a:rPr lang="en-US" dirty="0"/>
-              <a:t>” to scroll the screen</a:t>
-            </a:r>
-          </a:p>
-          <a:p>
-            <a:r>
-              <a:rPr lang="en-US" dirty="0"/>
-              <a:t>Use “set editor [&lt;name&gt;]” to define the </a:t>
+              <a:t>To view the missing information:</a:t>
+            </a:r>
+          </a:p>
+          <a:p>
+            <a:pPr lvl="1"/>
+            <a:r>
+              <a:rPr lang="en-US" dirty="0"/>
+              <a:t>Use command “&lt;query&gt;|more” to enter the Linux-style more mode, and press arrow keys to scroll </a:t>
             </a:r>
             <a:r>
               <a:rPr lang="en-US"/>
-              <a:t>default editor</a:t>
+              <a:t>the screen </a:t>
             </a:r>
             <a:endParaRPr lang="en-US" dirty="0"/>
           </a:p>
           <a:p>
+            <a:pPr lvl="1"/>
+            <a:r>
+              <a:rPr lang="en-US" dirty="0"/>
+              <a:t>Use command “out”, which will launch the editor to view the historical outputs.</a:t>
+            </a:r>
+          </a:p>
+          <a:p>
+            <a:pPr lvl="2"/>
+            <a:r>
+              <a:rPr lang="en-US" dirty="0"/>
+              <a:t>In case of the default editor is “vi”, you can use “W/B” to scroll the screen</a:t>
+            </a:r>
+          </a:p>
+          <a:p>
+            <a:pPr lvl="2"/>
+            <a:r>
+              <a:rPr lang="en-US" dirty="0"/>
+              <a:t>Use “set editor [&lt;name&gt;]” to define the default editor</a:t>
+            </a:r>
+          </a:p>
+          <a:p>
+            <a:pPr lvl="2"/>
             <a:r>
               <a:rPr lang="en-US" dirty="0"/>
               <a:t>Command “out”</a:t>
             </a:r>
           </a:p>
           <a:p>
-            <a:pPr lvl="1"/>
+            <a:pPr lvl="3"/>
             <a:r>
               <a:rPr lang="en-US" dirty="0">
                 <a:solidFill>
@@ -25765,7 +25766,7 @@
             </a:r>
           </a:p>
           <a:p>
-            <a:pPr lvl="1"/>
+            <a:pPr lvl="3"/>
             <a:r>
               <a:rPr lang="en-US" dirty="0">
                 <a:solidFill>
@@ -25788,7 +25789,7 @@
             </a:r>
           </a:p>
           <a:p>
-            <a:pPr lvl="1"/>
+            <a:pPr lvl="3"/>
             <a:r>
               <a:rPr lang="en-US" dirty="0">
                 <a:solidFill>

</xml_diff>

<commit_message>
prepare for next release
</commit_message>
<xml_diff>
--- a/docs/dbcli.pptx
+++ b/docs/dbcli.pptx
@@ -255,7 +255,7 @@
           <a:p>
             <a:fld id="{8924A7D2-5F3F-4CDE-BB06-760ED7F7BFAC}" type="datetimeFigureOut">
               <a:rPr lang="en-US" smtClean="0"/>
-              <a:t>1/5/2019</a:t>
+              <a:t>1/8/2019</a:t>
             </a:fld>
             <a:endParaRPr lang="en-US"/>
           </a:p>
@@ -6479,7 +6479,7 @@
           <a:p>
             <a:fld id="{830CF026-2A7D-4AC1-A6EC-3EB8F9A9FDD9}" type="datetimeFigureOut">
               <a:rPr lang="en-US" smtClean="0"/>
-              <a:t>1/5/2019</a:t>
+              <a:t>1/8/2019</a:t>
             </a:fld>
             <a:endParaRPr lang="en-US"/>
           </a:p>
@@ -6679,7 +6679,7 @@
           <a:p>
             <a:fld id="{830CF026-2A7D-4AC1-A6EC-3EB8F9A9FDD9}" type="datetimeFigureOut">
               <a:rPr lang="en-US" smtClean="0"/>
-              <a:t>1/5/2019</a:t>
+              <a:t>1/8/2019</a:t>
             </a:fld>
             <a:endParaRPr lang="en-US"/>
           </a:p>
@@ -6889,7 +6889,7 @@
           <a:p>
             <a:fld id="{830CF026-2A7D-4AC1-A6EC-3EB8F9A9FDD9}" type="datetimeFigureOut">
               <a:rPr lang="en-US" smtClean="0"/>
-              <a:t>1/5/2019</a:t>
+              <a:t>1/8/2019</a:t>
             </a:fld>
             <a:endParaRPr lang="en-US"/>
           </a:p>
@@ -7089,7 +7089,7 @@
           <a:p>
             <a:fld id="{830CF026-2A7D-4AC1-A6EC-3EB8F9A9FDD9}" type="datetimeFigureOut">
               <a:rPr lang="en-US" smtClean="0"/>
-              <a:t>1/5/2019</a:t>
+              <a:t>1/8/2019</a:t>
             </a:fld>
             <a:endParaRPr lang="en-US"/>
           </a:p>
@@ -7365,7 +7365,7 @@
           <a:p>
             <a:fld id="{830CF026-2A7D-4AC1-A6EC-3EB8F9A9FDD9}" type="datetimeFigureOut">
               <a:rPr lang="en-US" smtClean="0"/>
-              <a:t>1/5/2019</a:t>
+              <a:t>1/8/2019</a:t>
             </a:fld>
             <a:endParaRPr lang="en-US"/>
           </a:p>
@@ -7633,7 +7633,7 @@
           <a:p>
             <a:fld id="{830CF026-2A7D-4AC1-A6EC-3EB8F9A9FDD9}" type="datetimeFigureOut">
               <a:rPr lang="en-US" smtClean="0"/>
-              <a:t>1/5/2019</a:t>
+              <a:t>1/8/2019</a:t>
             </a:fld>
             <a:endParaRPr lang="en-US"/>
           </a:p>
@@ -8048,7 +8048,7 @@
           <a:p>
             <a:fld id="{830CF026-2A7D-4AC1-A6EC-3EB8F9A9FDD9}" type="datetimeFigureOut">
               <a:rPr lang="en-US" smtClean="0"/>
-              <a:t>1/5/2019</a:t>
+              <a:t>1/8/2019</a:t>
             </a:fld>
             <a:endParaRPr lang="en-US"/>
           </a:p>
@@ -8190,7 +8190,7 @@
           <a:p>
             <a:fld id="{830CF026-2A7D-4AC1-A6EC-3EB8F9A9FDD9}" type="datetimeFigureOut">
               <a:rPr lang="en-US" smtClean="0"/>
-              <a:t>1/5/2019</a:t>
+              <a:t>1/8/2019</a:t>
             </a:fld>
             <a:endParaRPr lang="en-US"/>
           </a:p>
@@ -8303,7 +8303,7 @@
           <a:p>
             <a:fld id="{830CF026-2A7D-4AC1-A6EC-3EB8F9A9FDD9}" type="datetimeFigureOut">
               <a:rPr lang="en-US" smtClean="0"/>
-              <a:t>1/5/2019</a:t>
+              <a:t>1/8/2019</a:t>
             </a:fld>
             <a:endParaRPr lang="en-US"/>
           </a:p>
@@ -8616,7 +8616,7 @@
           <a:p>
             <a:fld id="{830CF026-2A7D-4AC1-A6EC-3EB8F9A9FDD9}" type="datetimeFigureOut">
               <a:rPr lang="en-US" smtClean="0"/>
-              <a:t>1/5/2019</a:t>
+              <a:t>1/8/2019</a:t>
             </a:fld>
             <a:endParaRPr lang="en-US"/>
           </a:p>
@@ -8905,7 +8905,7 @@
           <a:p>
             <a:fld id="{830CF026-2A7D-4AC1-A6EC-3EB8F9A9FDD9}" type="datetimeFigureOut">
               <a:rPr lang="en-US" smtClean="0"/>
-              <a:t>1/5/2019</a:t>
+              <a:t>1/8/2019</a:t>
             </a:fld>
             <a:endParaRPr lang="en-US"/>
           </a:p>
@@ -9148,7 +9148,7 @@
           <a:p>
             <a:fld id="{830CF026-2A7D-4AC1-A6EC-3EB8F9A9FDD9}" type="datetimeFigureOut">
               <a:rPr lang="en-US" smtClean="0"/>
-              <a:t>1/5/2019</a:t>
+              <a:t>1/8/2019</a:t>
             </a:fld>
             <a:endParaRPr lang="en-US"/>
           </a:p>
@@ -25212,7 +25212,7 @@
           <a:graphicData uri="http://schemas.openxmlformats.org/presentationml/2006/ole">
             <mc:AlternateContent xmlns:mc="http://schemas.openxmlformats.org/markup-compatibility/2006">
               <mc:Choice xmlns:v="urn:schemas-microsoft-com:vml" Requires="v">
-                <p:oleObj spid="_x0000_s1116" name="BMP 图像" r:id="rId4" imgW="5000760" imgH="2257560" progId="Paint.Picture">
+                <p:oleObj spid="_x0000_s1117" name="BMP 图像" r:id="rId4" imgW="5000760" imgH="2257560" progId="Paint.Picture">
                   <p:embed/>
                 </p:oleObj>
               </mc:Choice>
@@ -25687,7 +25687,7 @@
         </p:spPr>
         <p:txBody>
           <a:bodyPr>
-            <a:normAutofit/>
+            <a:normAutofit lnSpcReduction="10000"/>
           </a:bodyPr>
           <a:lstStyle/>
           <a:p>
@@ -25706,19 +25706,53 @@
             <a:pPr lvl="1"/>
             <a:r>
               <a:rPr lang="en-US" dirty="0"/>
-              <a:t>Use command “&lt;query&gt;|more” to enter the Linux-style more mode, and press arrow keys to scroll </a:t>
+              <a:t>Use command “&lt;query&gt;</a:t>
+            </a:r>
+            <a:r>
+              <a:rPr lang="en-US" b="1" dirty="0"/>
+              <a:t>|less</a:t>
+            </a:r>
+            <a:r>
+              <a:rPr lang="en-US" dirty="0"/>
+              <a:t>” to enter the </a:t>
             </a:r>
             <a:r>
               <a:rPr lang="en-US"/>
-              <a:t>the screen </a:t>
-            </a:r>
-            <a:endParaRPr lang="en-US" dirty="0"/>
+              <a:t>Linux-style less </a:t>
+            </a:r>
+            <a:r>
+              <a:rPr lang="en-US" dirty="0"/>
+              <a:t>mode, and press arrow keys to scroll the screen</a:t>
+            </a:r>
           </a:p>
           <a:p>
             <a:pPr lvl="1"/>
             <a:r>
               <a:rPr lang="en-US" dirty="0"/>
-              <a:t>Use command “out”, which will launch the editor to view the historical outputs.</a:t>
+              <a:t>Use “</a:t>
+            </a:r>
+            <a:r>
+              <a:rPr lang="en-US" b="1" dirty="0"/>
+              <a:t>less last</a:t>
+            </a:r>
+            <a:r>
+              <a:rPr lang="en-US" dirty="0"/>
+              <a:t>” to view the last output in less mode</a:t>
+            </a:r>
+          </a:p>
+          <a:p>
+            <a:pPr lvl="1"/>
+            <a:r>
+              <a:rPr lang="en-US" dirty="0"/>
+              <a:t>Use command “</a:t>
+            </a:r>
+            <a:r>
+              <a:rPr lang="en-US" b="1" dirty="0"/>
+              <a:t>out</a:t>
+            </a:r>
+            <a:r>
+              <a:rPr lang="en-US" dirty="0"/>
+              <a:t>”, which will launch the editor to view the historical outputs.</a:t>
             </a:r>
           </a:p>
           <a:p>

</xml_diff>

<commit_message>
support annotation '@ARGS' in the scripting engine to limit the minimum number of input parameter
</commit_message>
<xml_diff>
--- a/docs/dbcli.pptx
+++ b/docs/dbcli.pptx
@@ -255,7 +255,7 @@
           <a:p>
             <a:fld id="{8924A7D2-5F3F-4CDE-BB06-760ED7F7BFAC}" type="datetimeFigureOut">
               <a:rPr lang="en-US" smtClean="0"/>
-              <a:t>1/8/2019</a:t>
+              <a:t>4/6/2019</a:t>
             </a:fld>
             <a:endParaRPr lang="en-US"/>
           </a:p>
@@ -6479,7 +6479,7 @@
           <a:p>
             <a:fld id="{830CF026-2A7D-4AC1-A6EC-3EB8F9A9FDD9}" type="datetimeFigureOut">
               <a:rPr lang="en-US" smtClean="0"/>
-              <a:t>1/8/2019</a:t>
+              <a:t>4/6/2019</a:t>
             </a:fld>
             <a:endParaRPr lang="en-US"/>
           </a:p>
@@ -6679,7 +6679,7 @@
           <a:p>
             <a:fld id="{830CF026-2A7D-4AC1-A6EC-3EB8F9A9FDD9}" type="datetimeFigureOut">
               <a:rPr lang="en-US" smtClean="0"/>
-              <a:t>1/8/2019</a:t>
+              <a:t>4/6/2019</a:t>
             </a:fld>
             <a:endParaRPr lang="en-US"/>
           </a:p>
@@ -6889,7 +6889,7 @@
           <a:p>
             <a:fld id="{830CF026-2A7D-4AC1-A6EC-3EB8F9A9FDD9}" type="datetimeFigureOut">
               <a:rPr lang="en-US" smtClean="0"/>
-              <a:t>1/8/2019</a:t>
+              <a:t>4/6/2019</a:t>
             </a:fld>
             <a:endParaRPr lang="en-US"/>
           </a:p>
@@ -7089,7 +7089,7 @@
           <a:p>
             <a:fld id="{830CF026-2A7D-4AC1-A6EC-3EB8F9A9FDD9}" type="datetimeFigureOut">
               <a:rPr lang="en-US" smtClean="0"/>
-              <a:t>1/8/2019</a:t>
+              <a:t>4/6/2019</a:t>
             </a:fld>
             <a:endParaRPr lang="en-US"/>
           </a:p>
@@ -7365,7 +7365,7 @@
           <a:p>
             <a:fld id="{830CF026-2A7D-4AC1-A6EC-3EB8F9A9FDD9}" type="datetimeFigureOut">
               <a:rPr lang="en-US" smtClean="0"/>
-              <a:t>1/8/2019</a:t>
+              <a:t>4/6/2019</a:t>
             </a:fld>
             <a:endParaRPr lang="en-US"/>
           </a:p>
@@ -7633,7 +7633,7 @@
           <a:p>
             <a:fld id="{830CF026-2A7D-4AC1-A6EC-3EB8F9A9FDD9}" type="datetimeFigureOut">
               <a:rPr lang="en-US" smtClean="0"/>
-              <a:t>1/8/2019</a:t>
+              <a:t>4/6/2019</a:t>
             </a:fld>
             <a:endParaRPr lang="en-US"/>
           </a:p>
@@ -8048,7 +8048,7 @@
           <a:p>
             <a:fld id="{830CF026-2A7D-4AC1-A6EC-3EB8F9A9FDD9}" type="datetimeFigureOut">
               <a:rPr lang="en-US" smtClean="0"/>
-              <a:t>1/8/2019</a:t>
+              <a:t>4/6/2019</a:t>
             </a:fld>
             <a:endParaRPr lang="en-US"/>
           </a:p>
@@ -8190,7 +8190,7 @@
           <a:p>
             <a:fld id="{830CF026-2A7D-4AC1-A6EC-3EB8F9A9FDD9}" type="datetimeFigureOut">
               <a:rPr lang="en-US" smtClean="0"/>
-              <a:t>1/8/2019</a:t>
+              <a:t>4/6/2019</a:t>
             </a:fld>
             <a:endParaRPr lang="en-US"/>
           </a:p>
@@ -8303,7 +8303,7 @@
           <a:p>
             <a:fld id="{830CF026-2A7D-4AC1-A6EC-3EB8F9A9FDD9}" type="datetimeFigureOut">
               <a:rPr lang="en-US" smtClean="0"/>
-              <a:t>1/8/2019</a:t>
+              <a:t>4/6/2019</a:t>
             </a:fld>
             <a:endParaRPr lang="en-US"/>
           </a:p>
@@ -8616,7 +8616,7 @@
           <a:p>
             <a:fld id="{830CF026-2A7D-4AC1-A6EC-3EB8F9A9FDD9}" type="datetimeFigureOut">
               <a:rPr lang="en-US" smtClean="0"/>
-              <a:t>1/8/2019</a:t>
+              <a:t>4/6/2019</a:t>
             </a:fld>
             <a:endParaRPr lang="en-US"/>
           </a:p>
@@ -8905,7 +8905,7 @@
           <a:p>
             <a:fld id="{830CF026-2A7D-4AC1-A6EC-3EB8F9A9FDD9}" type="datetimeFigureOut">
               <a:rPr lang="en-US" smtClean="0"/>
-              <a:t>1/8/2019</a:t>
+              <a:t>4/6/2019</a:t>
             </a:fld>
             <a:endParaRPr lang="en-US"/>
           </a:p>
@@ -9148,7 +9148,7 @@
           <a:p>
             <a:fld id="{830CF026-2A7D-4AC1-A6EC-3EB8F9A9FDD9}" type="datetimeFigureOut">
               <a:rPr lang="en-US" smtClean="0"/>
-              <a:t>1/8/2019</a:t>
+              <a:t>4/6/2019</a:t>
             </a:fld>
             <a:endParaRPr lang="en-US"/>
           </a:p>
@@ -17476,7 +17476,7 @@
         </p:spPr>
         <p:txBody>
           <a:bodyPr>
-            <a:normAutofit fontScale="55000" lnSpcReduction="20000"/>
+            <a:normAutofit fontScale="47500" lnSpcReduction="20000"/>
           </a:bodyPr>
           <a:lstStyle/>
           <a:p>
@@ -17724,6 +17724,31 @@
               <a:rPr lang="en-US" dirty="0"/>
               <a:t>” option is not defined in a switch annotation and current login user cannot match any requirement, then the script will exit with an error </a:t>
             </a:r>
+          </a:p>
+          <a:p>
+            <a:r>
+              <a:rPr lang="en-US" dirty="0"/>
+              <a:t>2 other annotations:</a:t>
+            </a:r>
+          </a:p>
+          <a:p>
+            <a:pPr lvl="1"/>
+            <a:r>
+              <a:rPr lang="en-US" dirty="0"/>
+              <a:t>@ALIAS: defines the nicknames of the script, multiple nicknames should be separated by comma(,)</a:t>
+            </a:r>
+          </a:p>
+          <a:p>
+            <a:pPr lvl="1"/>
+            <a:r>
+              <a:rPr lang="en-US" dirty="0"/>
+              <a:t>@ARGS: defines the minimum number of </a:t>
+            </a:r>
+            <a:r>
+              <a:rPr lang="en-US"/>
+              <a:t>input parameters</a:t>
+            </a:r>
+            <a:endParaRPr lang="en-US" dirty="0"/>
           </a:p>
           <a:p>
             <a:r>
@@ -25212,7 +25237,7 @@
           <a:graphicData uri="http://schemas.openxmlformats.org/presentationml/2006/ole">
             <mc:AlternateContent xmlns:mc="http://schemas.openxmlformats.org/markup-compatibility/2006">
               <mc:Choice xmlns:v="urn:schemas-microsoft-com:vml" Requires="v">
-                <p:oleObj spid="_x0000_s1117" name="BMP 图像" r:id="rId4" imgW="5000760" imgH="2257560" progId="Paint.Picture">
+                <p:oleObj spid="_x0000_s1118" name="BMP 图像" r:id="rId4" imgW="5000760" imgH="2257560" progId="Paint.Picture">
                   <p:embed/>
                 </p:oleObj>
               </mc:Choice>

</xml_diff>

<commit_message>
new option 'set cdbmode [off|cdb|pdb]', misc fixes and enhancements
</commit_message>
<xml_diff>
--- a/docs/dbcli.pptx
+++ b/docs/dbcli.pptx
@@ -256,7 +256,7 @@
           <a:p>
             <a:fld id="{8924A7D2-5F3F-4CDE-BB06-760ED7F7BFAC}" type="datetimeFigureOut">
               <a:rPr lang="en-US" smtClean="0"/>
-              <a:t>4/11/2019</a:t>
+              <a:t>4/12/2019</a:t>
             </a:fld>
             <a:endParaRPr lang="en-US"/>
           </a:p>
@@ -6480,7 +6480,7 @@
           <a:p>
             <a:fld id="{830CF026-2A7D-4AC1-A6EC-3EB8F9A9FDD9}" type="datetimeFigureOut">
               <a:rPr lang="en-US" smtClean="0"/>
-              <a:t>4/11/2019</a:t>
+              <a:t>4/12/2019</a:t>
             </a:fld>
             <a:endParaRPr lang="en-US"/>
           </a:p>
@@ -6680,7 +6680,7 @@
           <a:p>
             <a:fld id="{830CF026-2A7D-4AC1-A6EC-3EB8F9A9FDD9}" type="datetimeFigureOut">
               <a:rPr lang="en-US" smtClean="0"/>
-              <a:t>4/11/2019</a:t>
+              <a:t>4/12/2019</a:t>
             </a:fld>
             <a:endParaRPr lang="en-US"/>
           </a:p>
@@ -6890,7 +6890,7 @@
           <a:p>
             <a:fld id="{830CF026-2A7D-4AC1-A6EC-3EB8F9A9FDD9}" type="datetimeFigureOut">
               <a:rPr lang="en-US" smtClean="0"/>
-              <a:t>4/11/2019</a:t>
+              <a:t>4/12/2019</a:t>
             </a:fld>
             <a:endParaRPr lang="en-US"/>
           </a:p>
@@ -7090,7 +7090,7 @@
           <a:p>
             <a:fld id="{830CF026-2A7D-4AC1-A6EC-3EB8F9A9FDD9}" type="datetimeFigureOut">
               <a:rPr lang="en-US" smtClean="0"/>
-              <a:t>4/11/2019</a:t>
+              <a:t>4/12/2019</a:t>
             </a:fld>
             <a:endParaRPr lang="en-US"/>
           </a:p>
@@ -7366,7 +7366,7 @@
           <a:p>
             <a:fld id="{830CF026-2A7D-4AC1-A6EC-3EB8F9A9FDD9}" type="datetimeFigureOut">
               <a:rPr lang="en-US" smtClean="0"/>
-              <a:t>4/11/2019</a:t>
+              <a:t>4/12/2019</a:t>
             </a:fld>
             <a:endParaRPr lang="en-US"/>
           </a:p>
@@ -7634,7 +7634,7 @@
           <a:p>
             <a:fld id="{830CF026-2A7D-4AC1-A6EC-3EB8F9A9FDD9}" type="datetimeFigureOut">
               <a:rPr lang="en-US" smtClean="0"/>
-              <a:t>4/11/2019</a:t>
+              <a:t>4/12/2019</a:t>
             </a:fld>
             <a:endParaRPr lang="en-US"/>
           </a:p>
@@ -8049,7 +8049,7 @@
           <a:p>
             <a:fld id="{830CF026-2A7D-4AC1-A6EC-3EB8F9A9FDD9}" type="datetimeFigureOut">
               <a:rPr lang="en-US" smtClean="0"/>
-              <a:t>4/11/2019</a:t>
+              <a:t>4/12/2019</a:t>
             </a:fld>
             <a:endParaRPr lang="en-US"/>
           </a:p>
@@ -8191,7 +8191,7 @@
           <a:p>
             <a:fld id="{830CF026-2A7D-4AC1-A6EC-3EB8F9A9FDD9}" type="datetimeFigureOut">
               <a:rPr lang="en-US" smtClean="0"/>
-              <a:t>4/11/2019</a:t>
+              <a:t>4/12/2019</a:t>
             </a:fld>
             <a:endParaRPr lang="en-US"/>
           </a:p>
@@ -8304,7 +8304,7 @@
           <a:p>
             <a:fld id="{830CF026-2A7D-4AC1-A6EC-3EB8F9A9FDD9}" type="datetimeFigureOut">
               <a:rPr lang="en-US" smtClean="0"/>
-              <a:t>4/11/2019</a:t>
+              <a:t>4/12/2019</a:t>
             </a:fld>
             <a:endParaRPr lang="en-US"/>
           </a:p>
@@ -8617,7 +8617,7 @@
           <a:p>
             <a:fld id="{830CF026-2A7D-4AC1-A6EC-3EB8F9A9FDD9}" type="datetimeFigureOut">
               <a:rPr lang="en-US" smtClean="0"/>
-              <a:t>4/11/2019</a:t>
+              <a:t>4/12/2019</a:t>
             </a:fld>
             <a:endParaRPr lang="en-US"/>
           </a:p>
@@ -8906,7 +8906,7 @@
           <a:p>
             <a:fld id="{830CF026-2A7D-4AC1-A6EC-3EB8F9A9FDD9}" type="datetimeFigureOut">
               <a:rPr lang="en-US" smtClean="0"/>
-              <a:t>4/11/2019</a:t>
+              <a:t>4/12/2019</a:t>
             </a:fld>
             <a:endParaRPr lang="en-US"/>
           </a:p>
@@ -9149,7 +9149,7 @@
           <a:p>
             <a:fld id="{830CF026-2A7D-4AC1-A6EC-3EB8F9A9FDD9}" type="datetimeFigureOut">
               <a:rPr lang="en-US" smtClean="0"/>
-              <a:t>4/11/2019</a:t>
+              <a:t>4/12/2019</a:t>
             </a:fld>
             <a:endParaRPr lang="en-US"/>
           </a:p>
@@ -10338,8 +10338,8 @@
         </p:nvSpPr>
         <p:spPr>
           <a:xfrm>
-            <a:off x="838200" y="588411"/>
-            <a:ext cx="10515600" cy="1538101"/>
+            <a:off x="461818" y="588411"/>
+            <a:ext cx="11120582" cy="1538101"/>
           </a:xfrm>
         </p:spPr>
         <p:txBody>
@@ -10362,7 +10362,23 @@
                 <a:ea typeface="Tahoma" panose="020B0604030504040204" pitchFamily="34" charset="0"/>
                 <a:cs typeface="Tahoma" panose="020B0604030504040204" pitchFamily="34" charset="0"/>
               </a:rPr>
-              <a:t>:  auto rewrite all queries that refer to the Oracle views that contains field inst_id/</a:t>
+              <a:t>:  auto rewrite all SQL Texts that refer to the Oracle </a:t>
+            </a:r>
+            <a:r>
+              <a:rPr lang="en-US" sz="2000">
+                <a:latin typeface="Tahoma" panose="020B0604030504040204" pitchFamily="34" charset="0"/>
+                <a:ea typeface="Tahoma" panose="020B0604030504040204" pitchFamily="34" charset="0"/>
+                <a:cs typeface="Tahoma" panose="020B0604030504040204" pitchFamily="34" charset="0"/>
+              </a:rPr>
+              <a:t>views which contain </a:t>
+            </a:r>
+            <a:r>
+              <a:rPr lang="en-US" sz="2000" dirty="0">
+                <a:latin typeface="Tahoma" panose="020B0604030504040204" pitchFamily="34" charset="0"/>
+                <a:ea typeface="Tahoma" panose="020B0604030504040204" pitchFamily="34" charset="0"/>
+                <a:cs typeface="Tahoma" panose="020B0604030504040204" pitchFamily="34" charset="0"/>
+              </a:rPr>
+              <a:t>field inst_id/</a:t>
             </a:r>
             <a:r>
               <a:rPr lang="en-US" sz="2000" dirty="0" err="1">
@@ -10385,7 +10401,7 @@
                 <a:ea typeface="Tahoma" panose="020B0604030504040204" pitchFamily="34" charset="0"/>
                 <a:cs typeface="Tahoma" panose="020B0604030504040204" pitchFamily="34" charset="0"/>
               </a:rPr>
-              <a:t>Set dbid &lt;dbid&gt;/schema &lt;schema_name&gt;</a:t>
+              <a:t>Set dbid &lt;dbid&gt;/schema &lt;schema&gt;</a:t>
             </a:r>
             <a:r>
               <a:rPr lang="en-US" sz="2000" dirty="0">
@@ -10417,7 +10433,39 @@
                 <a:ea typeface="Tahoma" panose="020B0604030504040204" pitchFamily="34" charset="0"/>
                 <a:cs typeface="Tahoma" panose="020B0604030504040204" pitchFamily="34" charset="0"/>
               </a:rPr>
-              <a:t>&gt;: </a:t>
+              <a:t>&gt;/</a:t>
+            </a:r>
+            <a:r>
+              <a:rPr lang="en-US" sz="2000" b="1" dirty="0" err="1">
+                <a:latin typeface="Tahoma" panose="020B0604030504040204" pitchFamily="34" charset="0"/>
+                <a:ea typeface="Tahoma" panose="020B0604030504040204" pitchFamily="34" charset="0"/>
+                <a:cs typeface="Tahoma" panose="020B0604030504040204" pitchFamily="34" charset="0"/>
+              </a:rPr>
+              <a:t>cdbmode</a:t>
+            </a:r>
+            <a:r>
+              <a:rPr lang="en-US" sz="2000" b="1" dirty="0">
+                <a:latin typeface="Tahoma" panose="020B0604030504040204" pitchFamily="34" charset="0"/>
+                <a:ea typeface="Tahoma" panose="020B0604030504040204" pitchFamily="34" charset="0"/>
+                <a:cs typeface="Tahoma" panose="020B0604030504040204" pitchFamily="34" charset="0"/>
+              </a:rPr>
+              <a:t> </a:t>
+            </a:r>
+            <a:r>
+              <a:rPr lang="en-US" sz="2000" b="1" dirty="0" err="1">
+                <a:latin typeface="Tahoma" panose="020B0604030504040204" pitchFamily="34" charset="0"/>
+                <a:ea typeface="Tahoma" panose="020B0604030504040204" pitchFamily="34" charset="0"/>
+                <a:cs typeface="Tahoma" panose="020B0604030504040204" pitchFamily="34" charset="0"/>
+              </a:rPr>
+              <a:t>cdb|pdb</a:t>
+            </a:r>
+            <a:r>
+              <a:rPr lang="en-US" sz="2000" b="1" dirty="0">
+                <a:latin typeface="Tahoma" panose="020B0604030504040204" pitchFamily="34" charset="0"/>
+                <a:ea typeface="Tahoma" panose="020B0604030504040204" pitchFamily="34" charset="0"/>
+                <a:cs typeface="Tahoma" panose="020B0604030504040204" pitchFamily="34" charset="0"/>
+              </a:rPr>
+              <a:t>: </a:t>
             </a:r>
             <a:r>
               <a:rPr lang="en-US" sz="2000" dirty="0">
@@ -10445,13 +10493,13 @@
           <p:nvPr>
             <p:extLst>
               <p:ext uri="{D42A27DB-BD31-4B8C-83A1-F6EECF244321}">
-                <p14:modId xmlns:p14="http://schemas.microsoft.com/office/powerpoint/2010/main" val="288814129"/>
+                <p14:modId xmlns:p14="http://schemas.microsoft.com/office/powerpoint/2010/main" val="674635158"/>
               </p:ext>
             </p:extLst>
           </p:nvPr>
         </p:nvGraphicFramePr>
         <p:xfrm>
-          <a:off x="2257055" y="1627415"/>
+          <a:off x="1813709" y="1830615"/>
           <a:ext cx="8128000" cy="5120640"/>
         </p:xfrm>
         <a:graphic>
@@ -25491,7 +25539,7 @@
           <a:graphicData uri="http://schemas.openxmlformats.org/presentationml/2006/ole">
             <mc:AlternateContent xmlns:mc="http://schemas.openxmlformats.org/markup-compatibility/2006">
               <mc:Choice xmlns:v="urn:schemas-microsoft-com:vml" Requires="v">
-                <p:oleObj spid="_x0000_s1131" name="BMP 图像" r:id="rId4" imgW="5000760" imgH="2257560" progId="Paint.Picture">
+                <p:oleObj spid="_x0000_s1136" name="BMP 图像" r:id="rId4" imgW="5000760" imgH="2257560" progId="Paint.Picture">
                   <p:embed/>
                 </p:oleObj>
               </mc:Choice>

</xml_diff>